<commit_message>
`aes`, `rsa` restructured :file_folder:
</commit_message>
<xml_diff>
--- a/Offline 1/Resources/Cryptogrpahy_AES_RSA.pptx
+++ b/Offline 1/Resources/Cryptogrpahy_AES_RSA.pptx
@@ -302,7 +302,7 @@
           <a:p>
             <a:fld id="{1D8BD707-D9CF-40AE-B4C6-C98DA3205C09}" type="datetimeFigureOut">
               <a:rPr lang="en-US"/>
-              <a:t>5/18/2022</a:t>
+              <a:t>8/30/2022</a:t>
             </a:fld>
             <a:endParaRPr lang="en-US"/>
           </a:p>
@@ -479,7 +479,7 @@
           <a:p>
             <a:fld id="{1D8BD707-D9CF-40AE-B4C6-C98DA3205C09}" type="datetimeFigureOut">
               <a:rPr lang="en-US"/>
-              <a:t>5/18/2022</a:t>
+              <a:t>8/30/2022</a:t>
             </a:fld>
             <a:endParaRPr lang="en-US"/>
           </a:p>
@@ -693,7 +693,7 @@
           <a:p>
             <a:fld id="{1D8BD707-D9CF-40AE-B4C6-C98DA3205C09}" type="datetimeFigureOut">
               <a:rPr lang="en-US"/>
-              <a:t>5/18/2022</a:t>
+              <a:t>8/30/2022</a:t>
             </a:fld>
             <a:endParaRPr lang="en-US"/>
           </a:p>
@@ -841,7 +841,7 @@
           <a:p>
             <a:fld id="{1D8BD707-D9CF-40AE-B4C6-C98DA3205C09}" type="datetimeFigureOut">
               <a:rPr lang="en-US"/>
-              <a:t>5/18/2022</a:t>
+              <a:t>8/30/2022</a:t>
             </a:fld>
             <a:endParaRPr lang="en-US"/>
           </a:p>
@@ -997,7 +997,7 @@
           <a:p>
             <a:fld id="{1D8BD707-D9CF-40AE-B4C6-C98DA3205C09}" type="datetimeFigureOut">
               <a:rPr lang="en-US"/>
-              <a:t>5/18/2022</a:t>
+              <a:t>8/30/2022</a:t>
             </a:fld>
             <a:endParaRPr lang="en-US"/>
           </a:p>
@@ -1222,7 +1222,7 @@
           <a:p>
             <a:fld id="{1D8BD707-D9CF-40AE-B4C6-C98DA3205C09}" type="datetimeFigureOut">
               <a:rPr lang="en-US"/>
-              <a:t>5/18/2022</a:t>
+              <a:t>8/30/2022</a:t>
             </a:fld>
             <a:endParaRPr lang="en-US"/>
           </a:p>
@@ -3501,7 +3501,14 @@
                 <a:latin typeface="Liberation Sans"/>
                 <a:cs typeface="Liberation Sans"/>
               </a:rPr>
-              <a:t>expanded  </a:t>
+              <a:t>expanded</a:t>
+            </a:r>
+            <a:r>
+              <a:rPr lang="en-US" sz="2400" spc="-10" dirty="0">
+                <a:latin typeface="Liberation Sans"/>
+                <a:cs typeface="Liberation Sans"/>
+              </a:rPr>
+              <a:t> </a:t>
             </a:r>
             <a:r>
               <a:rPr sz="2400" spc="-5" dirty="0">
@@ -3564,7 +3571,21 @@
                 <a:latin typeface="Liberation Sans"/>
                 <a:cs typeface="Liberation Sans"/>
               </a:rPr>
-              <a:t>11 round  keys</a:t>
+              <a:t>11 round</a:t>
+            </a:r>
+            <a:r>
+              <a:rPr lang="en-US" sz="2400" spc="-5" dirty="0">
+                <a:latin typeface="Liberation Sans"/>
+                <a:cs typeface="Liberation Sans"/>
+              </a:rPr>
+              <a:t> </a:t>
+            </a:r>
+            <a:r>
+              <a:rPr sz="2400" spc="-5" dirty="0">
+                <a:latin typeface="Liberation Sans"/>
+                <a:cs typeface="Liberation Sans"/>
+              </a:rPr>
+              <a:t>keys</a:t>
             </a:r>
             <a:r>
               <a:rPr sz="2400" spc="5" dirty="0">
@@ -3601,7 +3622,7 @@
               </a:rPr>
               <a:t>bits).</a:t>
             </a:r>
-            <a:endParaRPr sz="2400">
+            <a:endParaRPr sz="2400" dirty="0">
               <a:latin typeface="Liberation Sans"/>
               <a:cs typeface="Liberation Sans"/>
             </a:endParaRPr>
@@ -3758,7 +3779,7 @@
               </a:rPr>
               <a:t>11.</a:t>
             </a:r>
-            <a:endParaRPr sz="2400">
+            <a:endParaRPr sz="2400" dirty="0">
               <a:latin typeface="Liberation Sans"/>
               <a:cs typeface="Liberation Sans"/>
             </a:endParaRPr>
@@ -5443,7 +5464,7 @@
               </a:rPr>
               <a:t>Rows</a:t>
             </a:r>
-            <a:endParaRPr sz="3200">
+            <a:endParaRPr sz="3200" dirty="0">
               <a:latin typeface="Liberation Sans"/>
               <a:cs typeface="Liberation Sans"/>
             </a:endParaRPr>
@@ -5513,7 +5534,7 @@
               </a:rPr>
               <a:t>direction.</a:t>
             </a:r>
-            <a:endParaRPr sz="3200">
+            <a:endParaRPr sz="3200" dirty="0">
               <a:latin typeface="Liberation Sans"/>
               <a:cs typeface="Liberation Sans"/>
             </a:endParaRPr>
@@ -5628,7 +5649,7 @@
               </a:rPr>
               <a:t>3.</a:t>
             </a:r>
-            <a:endParaRPr sz="3200">
+            <a:endParaRPr sz="3200" dirty="0">
               <a:latin typeface="Liberation Sans"/>
               <a:cs typeface="Liberation Sans"/>
             </a:endParaRPr>
@@ -6299,7 +6320,6 @@
               <a:rPr sz="2900" dirty="0"/>
               <a:t>columns</a:t>
             </a:r>
-            <a:endParaRPr sz="2900"/>
           </a:p>
           <a:p>
             <a:pPr marL="335280">
@@ -6330,7 +6350,6 @@
               <a:rPr sz="2900" dirty="0"/>
               <a:t>algorithm</a:t>
             </a:r>
-            <a:endParaRPr sz="2900"/>
           </a:p>
           <a:p>
             <a:pPr marL="335280">
@@ -6357,7 +6376,6 @@
               <a:rPr sz="2900" dirty="0"/>
               <a:t>block</a:t>
             </a:r>
-            <a:endParaRPr sz="2900"/>
           </a:p>
           <a:p>
             <a:pPr marL="335280" marR="5080">
@@ -6396,7 +6414,6 @@
               <a:rPr sz="2900" dirty="0"/>
               <a:t>field.</a:t>
             </a:r>
-            <a:endParaRPr sz="2900"/>
           </a:p>
           <a:p>
             <a:pPr marL="335280" marR="415290">
@@ -6427,7 +6444,6 @@
               <a:rPr sz="2900" dirty="0"/>
               <a:t>byte output.</a:t>
             </a:r>
-            <a:endParaRPr sz="2900"/>
           </a:p>
         </p:txBody>
       </p:sp>
@@ -13338,7 +13354,11 @@
             </a:r>
             <a:r>
               <a:rPr sz="2900" spc="5" dirty="0"/>
-              <a:t>to encrypt  </a:t>
+              <a:t>to encrypt</a:t>
+            </a:r>
+            <a:r>
+              <a:rPr lang="en-US" sz="2900" spc="5" dirty="0"/>
+              <a:t> </a:t>
             </a:r>
             <a:r>
               <a:rPr sz="2900" dirty="0"/>
@@ -13350,7 +13370,15 @@
             </a:r>
             <a:r>
               <a:rPr sz="2900" dirty="0"/>
-              <a:t>It takes 128 bit block of data and </a:t>
+              <a:t>It takes </a:t>
+            </a:r>
+            <a:r>
+              <a:rPr lang="en-US" sz="2900" dirty="0"/>
+              <a:t>128-bit</a:t>
+            </a:r>
+            <a:r>
+              <a:rPr sz="2900" dirty="0"/>
+              <a:t> block of data and </a:t>
             </a:r>
             <a:r>
               <a:rPr sz="2900" spc="5" dirty="0"/>
@@ -13374,7 +13402,23 @@
             </a:r>
             <a:r>
               <a:rPr sz="2900" dirty="0"/>
-              <a:t>ciphertext as output.The  functions</a:t>
+              <a:t>ciphertext as output.</a:t>
+            </a:r>
+            <a:r>
+              <a:rPr lang="en-US" sz="2900" dirty="0"/>
+              <a:t> </a:t>
+            </a:r>
+            <a:r>
+              <a:rPr sz="2900" dirty="0"/>
+              <a:t>The</a:t>
+            </a:r>
+            <a:r>
+              <a:rPr lang="en-US" sz="2900" dirty="0"/>
+              <a:t> </a:t>
+            </a:r>
+            <a:r>
+              <a:rPr sz="2900" dirty="0"/>
+              <a:t>functions</a:t>
             </a:r>
             <a:r>
               <a:rPr sz="2900" spc="5" dirty="0"/>

</xml_diff>